<commit_message>
Gestion des contacts un peu mieux et fonctionnelle mais pas encore au niveau du PowerPoint
</commit_message>
<xml_diff>
--- a/sources/gestion-contacts.pptx
+++ b/sources/gestion-contacts.pptx
@@ -289,7 +289,7 @@
           <a:p>
             <a:fld id="{B291CC90-6A5E-42A6-A85D-C053A89E9A68}" type="datetimeFigureOut">
               <a:rPr lang="fr-FR" smtClean="0"/>
-              <a:t>14/09/2018</a:t>
+              <a:t>09/08/2019</a:t>
             </a:fld>
             <a:endParaRPr lang="fr-FR"/>
           </a:p>
@@ -459,7 +459,7 @@
           <a:p>
             <a:fld id="{B291CC90-6A5E-42A6-A85D-C053A89E9A68}" type="datetimeFigureOut">
               <a:rPr lang="fr-FR" smtClean="0"/>
-              <a:t>14/09/2018</a:t>
+              <a:t>09/08/2019</a:t>
             </a:fld>
             <a:endParaRPr lang="fr-FR"/>
           </a:p>
@@ -639,7 +639,7 @@
           <a:p>
             <a:fld id="{B291CC90-6A5E-42A6-A85D-C053A89E9A68}" type="datetimeFigureOut">
               <a:rPr lang="fr-FR" smtClean="0"/>
-              <a:t>14/09/2018</a:t>
+              <a:t>09/08/2019</a:t>
             </a:fld>
             <a:endParaRPr lang="fr-FR"/>
           </a:p>
@@ -809,7 +809,7 @@
           <a:p>
             <a:fld id="{B291CC90-6A5E-42A6-A85D-C053A89E9A68}" type="datetimeFigureOut">
               <a:rPr lang="fr-FR" smtClean="0"/>
-              <a:t>14/09/2018</a:t>
+              <a:t>09/08/2019</a:t>
             </a:fld>
             <a:endParaRPr lang="fr-FR"/>
           </a:p>
@@ -1055,7 +1055,7 @@
           <a:p>
             <a:fld id="{B291CC90-6A5E-42A6-A85D-C053A89E9A68}" type="datetimeFigureOut">
               <a:rPr lang="fr-FR" smtClean="0"/>
-              <a:t>14/09/2018</a:t>
+              <a:t>09/08/2019</a:t>
             </a:fld>
             <a:endParaRPr lang="fr-FR"/>
           </a:p>
@@ -1343,7 +1343,7 @@
           <a:p>
             <a:fld id="{B291CC90-6A5E-42A6-A85D-C053A89E9A68}" type="datetimeFigureOut">
               <a:rPr lang="fr-FR" smtClean="0"/>
-              <a:t>14/09/2018</a:t>
+              <a:t>09/08/2019</a:t>
             </a:fld>
             <a:endParaRPr lang="fr-FR"/>
           </a:p>
@@ -1765,7 +1765,7 @@
           <a:p>
             <a:fld id="{B291CC90-6A5E-42A6-A85D-C053A89E9A68}" type="datetimeFigureOut">
               <a:rPr lang="fr-FR" smtClean="0"/>
-              <a:t>14/09/2018</a:t>
+              <a:t>09/08/2019</a:t>
             </a:fld>
             <a:endParaRPr lang="fr-FR"/>
           </a:p>
@@ -1883,7 +1883,7 @@
           <a:p>
             <a:fld id="{B291CC90-6A5E-42A6-A85D-C053A89E9A68}" type="datetimeFigureOut">
               <a:rPr lang="fr-FR" smtClean="0"/>
-              <a:t>14/09/2018</a:t>
+              <a:t>09/08/2019</a:t>
             </a:fld>
             <a:endParaRPr lang="fr-FR"/>
           </a:p>
@@ -1978,7 +1978,7 @@
           <a:p>
             <a:fld id="{B291CC90-6A5E-42A6-A85D-C053A89E9A68}" type="datetimeFigureOut">
               <a:rPr lang="fr-FR" smtClean="0"/>
-              <a:t>14/09/2018</a:t>
+              <a:t>09/08/2019</a:t>
             </a:fld>
             <a:endParaRPr lang="fr-FR"/>
           </a:p>
@@ -2255,7 +2255,7 @@
           <a:p>
             <a:fld id="{B291CC90-6A5E-42A6-A85D-C053A89E9A68}" type="datetimeFigureOut">
               <a:rPr lang="fr-FR" smtClean="0"/>
-              <a:t>14/09/2018</a:t>
+              <a:t>09/08/2019</a:t>
             </a:fld>
             <a:endParaRPr lang="fr-FR"/>
           </a:p>
@@ -2508,7 +2508,7 @@
           <a:p>
             <a:fld id="{B291CC90-6A5E-42A6-A85D-C053A89E9A68}" type="datetimeFigureOut">
               <a:rPr lang="fr-FR" smtClean="0"/>
-              <a:t>14/09/2018</a:t>
+              <a:t>09/08/2019</a:t>
             </a:fld>
             <a:endParaRPr lang="fr-FR"/>
           </a:p>
@@ -2721,7 +2721,7 @@
           <a:p>
             <a:fld id="{B291CC90-6A5E-42A6-A85D-C053A89E9A68}" type="datetimeFigureOut">
               <a:rPr lang="fr-FR" smtClean="0"/>
-              <a:t>14/09/2018</a:t>
+              <a:t>09/08/2019</a:t>
             </a:fld>
             <a:endParaRPr lang="fr-FR"/>
           </a:p>
@@ -3098,6 +3098,82 @@
       </p:grpSpPr>
       <p:sp>
         <p:nvSpPr>
+          <p:cNvPr id="5" name="Rectangle 4"/>
+          <p:cNvSpPr/>
+          <p:nvPr/>
+        </p:nvSpPr>
+        <p:spPr>
+          <a:xfrm>
+            <a:off x="4499992" y="1468328"/>
+            <a:ext cx="2304256" cy="1630807"/>
+          </a:xfrm>
+          <a:prstGeom prst="rect">
+            <a:avLst/>
+          </a:prstGeom>
+        </p:spPr>
+        <p:style>
+          <a:lnRef idx="2">
+            <a:schemeClr val="accent3"/>
+          </a:lnRef>
+          <a:fillRef idx="1">
+            <a:schemeClr val="lt1"/>
+          </a:fillRef>
+          <a:effectRef idx="0">
+            <a:schemeClr val="accent3"/>
+          </a:effectRef>
+          <a:fontRef idx="minor">
+            <a:schemeClr val="dk1"/>
+          </a:fontRef>
+        </p:style>
+        <p:txBody>
+          <a:bodyPr rtlCol="0" anchor="ctr"/>
+          <a:lstStyle/>
+          <a:p>
+            <a:pPr algn="ctr"/>
+            <a:endParaRPr lang="fr-FR"/>
+          </a:p>
+        </p:txBody>
+      </p:sp>
+      <p:sp>
+        <p:nvSpPr>
+          <p:cNvPr id="3" name="Rectangle 2"/>
+          <p:cNvSpPr/>
+          <p:nvPr/>
+        </p:nvSpPr>
+        <p:spPr>
+          <a:xfrm>
+            <a:off x="899592" y="1561483"/>
+            <a:ext cx="2262529" cy="1531611"/>
+          </a:xfrm>
+          <a:prstGeom prst="rect">
+            <a:avLst/>
+          </a:prstGeom>
+        </p:spPr>
+        <p:style>
+          <a:lnRef idx="2">
+            <a:schemeClr val="accent3"/>
+          </a:lnRef>
+          <a:fillRef idx="1">
+            <a:schemeClr val="lt1"/>
+          </a:fillRef>
+          <a:effectRef idx="0">
+            <a:schemeClr val="accent3"/>
+          </a:effectRef>
+          <a:fontRef idx="minor">
+            <a:schemeClr val="dk1"/>
+          </a:fontRef>
+        </p:style>
+        <p:txBody>
+          <a:bodyPr rtlCol="0" anchor="ctr"/>
+          <a:lstStyle/>
+          <a:p>
+            <a:pPr algn="ctr"/>
+            <a:endParaRPr lang="fr-FR"/>
+          </a:p>
+        </p:txBody>
+      </p:sp>
+      <p:sp>
+        <p:nvSpPr>
           <p:cNvPr id="10" name="ZoneTexte 9"/>
           <p:cNvSpPr txBox="1"/>
           <p:nvPr/>
@@ -4028,7 +4104,7 @@
         </p:nvSpPr>
         <p:spPr>
           <a:xfrm>
-            <a:off x="2673846" y="2668247"/>
+            <a:off x="2840834" y="2595548"/>
             <a:ext cx="768159" cy="215444"/>
           </a:xfrm>
           <a:prstGeom prst="rect">
@@ -4678,6 +4754,15 @@
           <a:prstGeom prst="rect">
             <a:avLst/>
           </a:prstGeom>
+          <a:ln>
+            <a:solidFill>
+              <a:schemeClr val="accent5">
+                <a:shade val="95000"/>
+                <a:satMod val="105000"/>
+              </a:schemeClr>
+            </a:solidFill>
+            <a:prstDash val="dash"/>
+          </a:ln>
         </p:spPr>
         <p:style>
           <a:lnRef idx="1">
@@ -4708,7 +4793,7 @@
           <a:p>
             <a:pPr algn="ctr"/>
             <a:r>
-              <a:rPr lang="fr-FR" u="none" dirty="0">
+              <a:rPr lang="fr-FR" i="1" u="none" dirty="0">
                 <a:solidFill>
                   <a:schemeClr val="tx1"/>
                 </a:solidFill>
@@ -4719,7 +4804,7 @@
           <a:p>
             <a:pPr algn="ctr"/>
             <a:r>
-              <a:rPr lang="fr-FR" u="none" dirty="0">
+              <a:rPr lang="fr-FR" i="1" u="none" dirty="0">
                 <a:solidFill>
                   <a:schemeClr val="tx1"/>
                 </a:solidFill>
@@ -4730,7 +4815,7 @@
           <a:p>
             <a:pPr algn="ctr"/>
             <a:r>
-              <a:rPr lang="fr-FR" u="none" dirty="0">
+              <a:rPr lang="fr-FR" i="1" u="none" dirty="0">
                 <a:solidFill>
                   <a:schemeClr val="tx1"/>
                 </a:solidFill>
@@ -4738,7 +4823,7 @@
               <a:t>Si </a:t>
             </a:r>
             <a:r>
-              <a:rPr lang="fr-FR" u="none" dirty="0" err="1">
+              <a:rPr lang="fr-FR" i="1" u="none" dirty="0" err="1">
                 <a:solidFill>
                   <a:schemeClr val="tx1"/>
                 </a:solidFill>
@@ -4746,7 +4831,7 @@
               <a:t>VitAvant</a:t>
             </a:r>
             <a:r>
-              <a:rPr lang="fr-FR" u="none" dirty="0">
+              <a:rPr lang="fr-FR" i="1" u="none" dirty="0">
                 <a:solidFill>
                   <a:schemeClr val="tx1"/>
                 </a:solidFill>
@@ -4819,6 +4904,67 @@
               <a:t>Pour chaque joueur</a:t>
             </a:r>
             <a:endParaRPr lang="fr-FR" dirty="0"/>
+          </a:p>
+        </p:txBody>
+      </p:sp>
+      <p:sp>
+        <p:nvSpPr>
+          <p:cNvPr id="4" name="ZoneTexte 3"/>
+          <p:cNvSpPr txBox="1"/>
+          <p:nvPr/>
+        </p:nvSpPr>
+        <p:spPr>
+          <a:xfrm>
+            <a:off x="899591" y="2883691"/>
+            <a:ext cx="2262529" cy="215444"/>
+          </a:xfrm>
+          <a:prstGeom prst="rect">
+            <a:avLst/>
+          </a:prstGeom>
+          <a:noFill/>
+        </p:spPr>
+        <p:txBody>
+          <a:bodyPr wrap="square" rtlCol="0">
+            <a:spAutoFit/>
+          </a:bodyPr>
+          <a:lstStyle/>
+          <a:p>
+            <a:r>
+              <a:rPr lang="fr-FR" sz="800" dirty="0" smtClean="0"/>
+              <a:t>Répertorie les trucs proches</a:t>
+            </a:r>
+            <a:endParaRPr lang="fr-FR" sz="800" dirty="0"/>
+          </a:p>
+        </p:txBody>
+      </p:sp>
+      <p:sp>
+        <p:nvSpPr>
+          <p:cNvPr id="6" name="ZoneTexte 5"/>
+          <p:cNvSpPr txBox="1"/>
+          <p:nvPr/>
+        </p:nvSpPr>
+        <p:spPr>
+          <a:xfrm>
+            <a:off x="4499992" y="2914469"/>
+            <a:ext cx="2304256" cy="215444"/>
+          </a:xfrm>
+          <a:prstGeom prst="rect">
+            <a:avLst/>
+          </a:prstGeom>
+          <a:noFill/>
+        </p:spPr>
+        <p:txBody>
+          <a:bodyPr wrap="square" rtlCol="0">
+            <a:spAutoFit/>
+          </a:bodyPr>
+          <a:lstStyle/>
+          <a:p>
+            <a:pPr algn="r"/>
+            <a:r>
+              <a:rPr lang="fr-FR" sz="800" dirty="0" smtClean="0"/>
+              <a:t>Calcule l’accélération cible</a:t>
+            </a:r>
+            <a:endParaRPr lang="fr-FR" sz="800" dirty="0"/>
           </a:p>
         </p:txBody>
       </p:sp>
@@ -5148,24 +5294,14 @@
           <a:p>
             <a:r>
               <a:rPr lang="fr-FR" sz="800" u="sng" dirty="0" smtClean="0"/>
-              <a:t>:</a:t>
-            </a:r>
+              <a:t>:DepEffectué_N+1</a:t>
+            </a:r>
+          </a:p>
+          <a:p>
             <a:r>
               <a:rPr lang="fr-FR" sz="800" u="sng" dirty="0" smtClean="0"/>
-              <a:t>DepEffectué_N+1</a:t>
-            </a:r>
-            <a:endParaRPr lang="fr-FR" sz="800" u="sng" dirty="0" smtClean="0"/>
-          </a:p>
-          <a:p>
-            <a:r>
-              <a:rPr lang="fr-FR" sz="800" u="sng" dirty="0" smtClean="0"/>
-              <a:t>:</a:t>
-            </a:r>
-            <a:r>
-              <a:rPr lang="fr-FR" sz="800" u="sng" dirty="0" smtClean="0"/>
-              <a:t>DepPotentiel_N+1</a:t>
-            </a:r>
-            <a:endParaRPr lang="fr-FR" sz="800" u="sng" dirty="0" smtClean="0"/>
+              <a:t>:DepPotentiel_N+1</a:t>
+            </a:r>
           </a:p>
         </p:txBody>
       </p:sp>
@@ -5372,7 +5508,6 @@
               <a:rPr lang="fr-FR" sz="800" dirty="0" smtClean="0"/>
               <a:t> / T</a:t>
             </a:r>
-            <a:endParaRPr lang="fr-FR" sz="800" dirty="0" smtClean="0"/>
           </a:p>
         </p:txBody>
       </p:sp>
@@ -5469,11 +5604,7 @@
           <a:p>
             <a:r>
               <a:rPr lang="fr-FR" sz="800" u="sng" dirty="0" smtClean="0"/>
-              <a:t>:</a:t>
-            </a:r>
-            <a:r>
-              <a:rPr lang="fr-FR" sz="800" u="sng" dirty="0" smtClean="0"/>
-              <a:t>Déplacement</a:t>
+              <a:t>:Déplacement</a:t>
             </a:r>
           </a:p>
           <a:p>
@@ -5481,7 +5612,6 @@
               <a:rPr lang="fr-FR" sz="800" u="sng" dirty="0" smtClean="0"/>
               <a:t>:Vitesse</a:t>
             </a:r>
-            <a:endParaRPr lang="fr-FR" sz="800" u="sng" dirty="0" smtClean="0"/>
           </a:p>
         </p:txBody>
       </p:sp>
@@ -5509,24 +5639,14 @@
           <a:p>
             <a:r>
               <a:rPr lang="fr-FR" sz="800" u="sng" dirty="0" smtClean="0"/>
-              <a:t>:</a:t>
-            </a:r>
+              <a:t>:DepEffectué_N+1</a:t>
+            </a:r>
+          </a:p>
+          <a:p>
             <a:r>
               <a:rPr lang="fr-FR" sz="800" u="sng" dirty="0" smtClean="0"/>
-              <a:t>DepEffectué_N+1</a:t>
-            </a:r>
-            <a:endParaRPr lang="fr-FR" sz="800" u="sng" dirty="0" smtClean="0"/>
-          </a:p>
-          <a:p>
-            <a:r>
-              <a:rPr lang="fr-FR" sz="800" u="sng" dirty="0" smtClean="0"/>
-              <a:t>:</a:t>
-            </a:r>
-            <a:r>
-              <a:rPr lang="fr-FR" sz="800" u="sng" dirty="0" smtClean="0"/>
-              <a:t>DepPotentiel_N+1</a:t>
-            </a:r>
-            <a:endParaRPr lang="fr-FR" sz="800" u="sng" dirty="0" smtClean="0"/>
+              <a:t>:DepPotentiel_N+1</a:t>
+            </a:r>
           </a:p>
         </p:txBody>
       </p:sp>

</xml_diff>